<commit_message>
Added Material for 1.12.
</commit_message>
<xml_diff>
--- a/Material/Cat_Jump/01_Einführung_Godot_Cat_Jump.pptx
+++ b/Material/Cat_Jump/01_Einführung_Godot_Cat_Jump.pptx
@@ -29,6 +29,10 @@
     <p:sldId id="277" r:id="rId23"/>
     <p:sldId id="278" r:id="rId24"/>
     <p:sldId id="279" r:id="rId25"/>
+    <p:sldId id="280" r:id="rId26"/>
+    <p:sldId id="281" r:id="rId27"/>
+    <p:sldId id="282" r:id="rId28"/>
+    <p:sldId id="283" r:id="rId29"/>
   </p:sldIdLst>
   <p:sldSz cx="12192000" cy="6858000"/>
   <p:notesSz cx="6858000" cy="9144000"/>
@@ -318,7 +322,7 @@
           <a:p>
             <a:fld id="{4AAD347D-5ACD-4C99-B74B-A9C85AD731AF}" type="datetimeFigureOut">
               <a:rPr lang="en-US" dirty="0"/>
-              <a:t>10/27/2021</a:t>
+              <a:t>12/1/2021</a:t>
             </a:fld>
             <a:endParaRPr lang="en-US" dirty="0"/>
           </a:p>
@@ -588,7 +592,7 @@
           <a:p>
             <a:fld id="{4509A250-FF31-4206-8172-F9D3106AACB1}" type="datetimeFigureOut">
               <a:rPr lang="en-US" dirty="0"/>
-              <a:t>10/27/2021</a:t>
+              <a:t>12/1/2021</a:t>
             </a:fld>
             <a:endParaRPr lang="en-US" dirty="0"/>
           </a:p>
@@ -777,7 +781,7 @@
           <a:p>
             <a:fld id="{4509A250-FF31-4206-8172-F9D3106AACB1}" type="datetimeFigureOut">
               <a:rPr lang="en-US" dirty="0"/>
-              <a:t>10/27/2021</a:t>
+              <a:t>12/1/2021</a:t>
             </a:fld>
             <a:endParaRPr lang="en-US" dirty="0"/>
           </a:p>
@@ -1040,7 +1044,7 @@
           <a:p>
             <a:fld id="{4509A250-FF31-4206-8172-F9D3106AACB1}" type="datetimeFigureOut">
               <a:rPr lang="en-US" dirty="0"/>
-              <a:t>10/27/2021</a:t>
+              <a:t>12/1/2021</a:t>
             </a:fld>
             <a:endParaRPr lang="en-US" dirty="0"/>
           </a:p>
@@ -1367,7 +1371,7 @@
           <a:p>
             <a:fld id="{4509A250-FF31-4206-8172-F9D3106AACB1}" type="datetimeFigureOut">
               <a:rPr lang="en-US" dirty="0"/>
-              <a:t>10/27/2021</a:t>
+              <a:t>12/1/2021</a:t>
             </a:fld>
             <a:endParaRPr lang="en-US" dirty="0"/>
           </a:p>
@@ -1972,7 +1976,7 @@
           <a:p>
             <a:fld id="{4509A250-FF31-4206-8172-F9D3106AACB1}" type="datetimeFigureOut">
               <a:rPr lang="en-US" dirty="0"/>
-              <a:t>10/27/2021</a:t>
+              <a:t>12/1/2021</a:t>
             </a:fld>
             <a:endParaRPr lang="en-US" dirty="0"/>
           </a:p>
@@ -2814,7 +2818,7 @@
           <a:p>
             <a:fld id="{4509A250-FF31-4206-8172-F9D3106AACB1}" type="datetimeFigureOut">
               <a:rPr lang="en-US" dirty="0"/>
-              <a:t>10/27/2021</a:t>
+              <a:t>12/1/2021</a:t>
             </a:fld>
             <a:endParaRPr lang="en-US" dirty="0"/>
           </a:p>
@@ -2979,7 +2983,7 @@
           <a:p>
             <a:fld id="{4509A250-FF31-4206-8172-F9D3106AACB1}" type="datetimeFigureOut">
               <a:rPr lang="en-US" dirty="0"/>
-              <a:t>10/27/2021</a:t>
+              <a:t>12/1/2021</a:t>
             </a:fld>
             <a:endParaRPr lang="en-US" dirty="0"/>
           </a:p>
@@ -3154,7 +3158,7 @@
           <a:p>
             <a:fld id="{4509A250-FF31-4206-8172-F9D3106AACB1}" type="datetimeFigureOut">
               <a:rPr lang="en-US" dirty="0"/>
-              <a:t>10/27/2021</a:t>
+              <a:t>12/1/2021</a:t>
             </a:fld>
             <a:endParaRPr lang="en-US" dirty="0"/>
           </a:p>
@@ -3319,7 +3323,7 @@
           <a:p>
             <a:fld id="{4509A250-FF31-4206-8172-F9D3106AACB1}" type="datetimeFigureOut">
               <a:rPr lang="en-US" dirty="0"/>
-              <a:t>10/27/2021</a:t>
+              <a:t>12/1/2021</a:t>
             </a:fld>
             <a:endParaRPr lang="en-US" dirty="0"/>
           </a:p>
@@ -3558,7 +3562,7 @@
           <a:p>
             <a:fld id="{4509A250-FF31-4206-8172-F9D3106AACB1}" type="datetimeFigureOut">
               <a:rPr lang="en-US" dirty="0"/>
-              <a:t>10/27/2021</a:t>
+              <a:t>12/1/2021</a:t>
             </a:fld>
             <a:endParaRPr lang="en-US" dirty="0"/>
           </a:p>
@@ -3845,7 +3849,7 @@
           <a:p>
             <a:fld id="{4509A250-FF31-4206-8172-F9D3106AACB1}" type="datetimeFigureOut">
               <a:rPr lang="en-US" dirty="0"/>
-              <a:t>10/27/2021</a:t>
+              <a:t>12/1/2021</a:t>
             </a:fld>
             <a:endParaRPr lang="en-US" dirty="0"/>
           </a:p>
@@ -4278,7 +4282,7 @@
           <a:p>
             <a:fld id="{4509A250-FF31-4206-8172-F9D3106AACB1}" type="datetimeFigureOut">
               <a:rPr lang="en-US" dirty="0"/>
-              <a:t>10/27/2021</a:t>
+              <a:t>12/1/2021</a:t>
             </a:fld>
             <a:endParaRPr lang="en-US" dirty="0"/>
           </a:p>
@@ -4391,7 +4395,7 @@
           <a:p>
             <a:fld id="{4509A250-FF31-4206-8172-F9D3106AACB1}" type="datetimeFigureOut">
               <a:rPr lang="en-US" dirty="0"/>
-              <a:t>10/27/2021</a:t>
+              <a:t>12/1/2021</a:t>
             </a:fld>
             <a:endParaRPr lang="en-US" dirty="0"/>
           </a:p>
@@ -4481,7 +4485,7 @@
           <a:p>
             <a:fld id="{4509A250-FF31-4206-8172-F9D3106AACB1}" type="datetimeFigureOut">
               <a:rPr lang="en-US" dirty="0"/>
-              <a:t>10/27/2021</a:t>
+              <a:t>12/1/2021</a:t>
             </a:fld>
             <a:endParaRPr lang="en-US" dirty="0"/>
           </a:p>
@@ -4755,7 +4759,7 @@
           <a:p>
             <a:fld id="{4509A250-FF31-4206-8172-F9D3106AACB1}" type="datetimeFigureOut">
               <a:rPr lang="en-US" dirty="0"/>
-              <a:t>10/27/2021</a:t>
+              <a:t>12/1/2021</a:t>
             </a:fld>
             <a:endParaRPr lang="en-US" dirty="0"/>
           </a:p>
@@ -5025,7 +5029,7 @@
           <a:p>
             <a:fld id="{4509A250-FF31-4206-8172-F9D3106AACB1}" type="datetimeFigureOut">
               <a:rPr lang="en-US" dirty="0"/>
-              <a:t>10/27/2021</a:t>
+              <a:t>12/1/2021</a:t>
             </a:fld>
             <a:endParaRPr lang="en-US" dirty="0"/>
           </a:p>
@@ -5449,7 +5453,7 @@
           <a:p>
             <a:fld id="{4509A250-FF31-4206-8172-F9D3106AACB1}" type="datetimeFigureOut">
               <a:rPr lang="en-US" dirty="0"/>
-              <a:t>10/27/2021</a:t>
+              <a:t>12/1/2021</a:t>
             </a:fld>
             <a:endParaRPr lang="en-US" dirty="0"/>
           </a:p>
@@ -6124,11 +6128,7 @@
             </a:r>
             <a:r>
               <a:rPr lang="de-DE" dirty="0" smtClean="0"/>
-              <a:t> </a:t>
-            </a:r>
-            <a:r>
-              <a:rPr lang="de-DE" dirty="0" smtClean="0"/>
-              <a:t>jump</a:t>
+              <a:t> jump</a:t>
             </a:r>
           </a:p>
           <a:p>
@@ -7318,11 +7318,7 @@
             </a:r>
             <a:r>
               <a:rPr lang="de-DE" dirty="0" smtClean="0"/>
-              <a:t> </a:t>
-            </a:r>
-            <a:r>
-              <a:rPr lang="de-DE" dirty="0" smtClean="0"/>
-              <a:t>Nodes – Area2D</a:t>
+              <a:t> Nodes – Area2D</a:t>
             </a:r>
             <a:endParaRPr lang="de-DE" sz="1800" dirty="0"/>
           </a:p>
@@ -7989,11 +7985,7 @@
             </a:r>
             <a:r>
               <a:rPr lang="de-DE" dirty="0" smtClean="0"/>
-              <a:t>x Sekunden erzeugt und dem Level hinzugefügt werden. </a:t>
-            </a:r>
-            <a:r>
-              <a:rPr lang="de-DE" dirty="0" smtClean="0"/>
-              <a:t>(</a:t>
+              <a:t>x Sekunden erzeugt und dem Level hinzugefügt werden. (</a:t>
             </a:r>
             <a:r>
               <a:rPr lang="de-DE" dirty="0" err="1"/>
@@ -10138,7 +10130,6 @@
               <a:rPr lang="de-DE" dirty="0" smtClean="0"/>
               <a:t>:</a:t>
             </a:r>
-            <a:endParaRPr lang="de-DE" dirty="0" smtClean="0"/>
           </a:p>
           <a:p>
             <a:pPr marL="285750" indent="-285750">
@@ -10147,13 +10138,8 @@
             </a:pPr>
             <a:r>
               <a:rPr lang="de-DE" dirty="0" smtClean="0"/>
-              <a:t>Bewegt sich von rechts nach </a:t>
-            </a:r>
-            <a:r>
-              <a:rPr lang="de-DE" dirty="0" smtClean="0"/>
-              <a:t>links</a:t>
-            </a:r>
-            <a:endParaRPr lang="de-DE" dirty="0" smtClean="0"/>
+              <a:t>Bewegt sich von rechts nach links</a:t>
+            </a:r>
           </a:p>
           <a:p>
             <a:pPr marL="285750" indent="-285750">
@@ -12298,6 +12284,1157 @@
     <p:extLst>
       <p:ext uri="{BB962C8B-B14F-4D97-AF65-F5344CB8AC3E}">
         <p14:creationId xmlns:p14="http://schemas.microsoft.com/office/powerpoint/2010/main" val="200188099"/>
+      </p:ext>
+    </p:extLst>
+  </p:cSld>
+  <p:clrMapOvr>
+    <a:masterClrMapping/>
+  </p:clrMapOvr>
+  <p:timing>
+    <p:tnLst>
+      <p:par>
+        <p:cTn id="1" dur="indefinite" restart="never" nodeType="tmRoot"/>
+      </p:par>
+    </p:tnLst>
+  </p:timing>
+</p:sld>
+</file>
+
+<file path=ppt/slides/slide25.xml><?xml version="1.0" encoding="utf-8"?>
+<p:sld xmlns:a="http://schemas.openxmlformats.org/drawingml/2006/main" xmlns:r="http://schemas.openxmlformats.org/officeDocument/2006/relationships" xmlns:p="http://schemas.openxmlformats.org/presentationml/2006/main">
+  <p:cSld>
+    <p:spTree>
+      <p:nvGrpSpPr>
+        <p:cNvPr id="1" name=""/>
+        <p:cNvGrpSpPr/>
+        <p:nvPr/>
+      </p:nvGrpSpPr>
+      <p:grpSpPr>
+        <a:xfrm>
+          <a:off x="0" y="0"/>
+          <a:ext cx="0" cy="0"/>
+          <a:chOff x="0" y="0"/>
+          <a:chExt cx="0" cy="0"/>
+        </a:xfrm>
+      </p:grpSpPr>
+      <p:sp>
+        <p:nvSpPr>
+          <p:cNvPr id="2" name="Titel 1"/>
+          <p:cNvSpPr>
+            <a:spLocks noGrp="1"/>
+          </p:cNvSpPr>
+          <p:nvPr>
+            <p:ph type="ctrTitle"/>
+          </p:nvPr>
+        </p:nvSpPr>
+        <p:spPr>
+          <a:xfrm>
+            <a:off x="656192" y="3443592"/>
+            <a:ext cx="7527227" cy="1286036"/>
+          </a:xfrm>
+        </p:spPr>
+        <p:txBody>
+          <a:bodyPr/>
+          <a:lstStyle/>
+          <a:p>
+            <a:r>
+              <a:rPr lang="de-DE" sz="4800" dirty="0" smtClean="0"/>
+              <a:t>Punktestand und Hauptmenu hinzufügen</a:t>
+            </a:r>
+            <a:endParaRPr lang="de-DE" sz="4800" dirty="0"/>
+          </a:p>
+        </p:txBody>
+      </p:sp>
+      <p:sp>
+        <p:nvSpPr>
+          <p:cNvPr id="3" name="Untertitel 2"/>
+          <p:cNvSpPr>
+            <a:spLocks noGrp="1"/>
+          </p:cNvSpPr>
+          <p:nvPr>
+            <p:ph type="subTitle" idx="1"/>
+          </p:nvPr>
+        </p:nvSpPr>
+        <p:spPr>
+          <a:xfrm>
+            <a:off x="656192" y="4768144"/>
+            <a:ext cx="8825658" cy="861420"/>
+          </a:xfrm>
+        </p:spPr>
+        <p:txBody>
+          <a:bodyPr/>
+          <a:lstStyle/>
+          <a:p>
+            <a:r>
+              <a:rPr lang="de-DE" dirty="0" smtClean="0"/>
+              <a:t>Part 3</a:t>
+            </a:r>
+          </a:p>
+        </p:txBody>
+      </p:sp>
+      <p:pic>
+        <p:nvPicPr>
+          <p:cNvPr id="4" name="Grafik 3"/>
+          <p:cNvPicPr>
+            <a:picLocks noChangeAspect="1"/>
+          </p:cNvPicPr>
+          <p:nvPr/>
+        </p:nvPicPr>
+        <p:blipFill>
+          <a:blip r:embed="rId2"/>
+          <a:stretch>
+            <a:fillRect/>
+          </a:stretch>
+        </p:blipFill>
+        <p:spPr>
+          <a:xfrm>
+            <a:off x="7684655" y="3082100"/>
+            <a:ext cx="4064000" cy="2033627"/>
+          </a:xfrm>
+          <a:prstGeom prst="roundRect">
+            <a:avLst>
+              <a:gd name="adj" fmla="val 8594"/>
+            </a:avLst>
+          </a:prstGeom>
+          <a:solidFill>
+            <a:srgbClr val="FFFFFF">
+              <a:shade val="85000"/>
+            </a:srgbClr>
+          </a:solidFill>
+          <a:ln>
+            <a:noFill/>
+          </a:ln>
+          <a:effectLst>
+            <a:reflection blurRad="12700" stA="38000" endPos="28000" dist="5000" dir="5400000" sy="-100000" algn="bl" rotWithShape="0"/>
+          </a:effectLst>
+        </p:spPr>
+      </p:pic>
+    </p:spTree>
+    <p:extLst>
+      <p:ext uri="{BB962C8B-B14F-4D97-AF65-F5344CB8AC3E}">
+        <p14:creationId xmlns:p14="http://schemas.microsoft.com/office/powerpoint/2010/main" val="1648062452"/>
+      </p:ext>
+    </p:extLst>
+  </p:cSld>
+  <p:clrMapOvr>
+    <a:masterClrMapping/>
+  </p:clrMapOvr>
+  <p:timing>
+    <p:tnLst>
+      <p:par>
+        <p:cTn id="1" dur="indefinite" restart="never" nodeType="tmRoot"/>
+      </p:par>
+    </p:tnLst>
+  </p:timing>
+</p:sld>
+</file>
+
+<file path=ppt/slides/slide26.xml><?xml version="1.0" encoding="utf-8"?>
+<p:sld xmlns:a="http://schemas.openxmlformats.org/drawingml/2006/main" xmlns:r="http://schemas.openxmlformats.org/officeDocument/2006/relationships" xmlns:p="http://schemas.openxmlformats.org/presentationml/2006/main">
+  <p:cSld>
+    <p:spTree>
+      <p:nvGrpSpPr>
+        <p:cNvPr id="1" name=""/>
+        <p:cNvGrpSpPr/>
+        <p:nvPr/>
+      </p:nvGrpSpPr>
+      <p:grpSpPr>
+        <a:xfrm>
+          <a:off x="0" y="0"/>
+          <a:ext cx="0" cy="0"/>
+          <a:chOff x="0" y="0"/>
+          <a:chExt cx="0" cy="0"/>
+        </a:xfrm>
+      </p:grpSpPr>
+      <p:pic>
+        <p:nvPicPr>
+          <p:cNvPr id="4" name="Grafik 3"/>
+          <p:cNvPicPr>
+            <a:picLocks noChangeAspect="1"/>
+          </p:cNvPicPr>
+          <p:nvPr/>
+        </p:nvPicPr>
+        <p:blipFill>
+          <a:blip r:embed="rId2"/>
+          <a:stretch>
+            <a:fillRect/>
+          </a:stretch>
+        </p:blipFill>
+        <p:spPr>
+          <a:xfrm>
+            <a:off x="1496292" y="1433077"/>
+            <a:ext cx="3251200" cy="1887064"/>
+          </a:xfrm>
+          <a:prstGeom prst="roundRect">
+            <a:avLst>
+              <a:gd name="adj" fmla="val 8594"/>
+            </a:avLst>
+          </a:prstGeom>
+          <a:solidFill>
+            <a:srgbClr val="FFFFFF">
+              <a:shade val="85000"/>
+            </a:srgbClr>
+          </a:solidFill>
+          <a:ln>
+            <a:noFill/>
+          </a:ln>
+          <a:effectLst>
+            <a:reflection blurRad="12700" stA="38000" endPos="28000" dist="5000" dir="5400000" sy="-100000" algn="bl" rotWithShape="0"/>
+          </a:effectLst>
+        </p:spPr>
+      </p:pic>
+      <p:sp>
+        <p:nvSpPr>
+          <p:cNvPr id="6" name="Untertitel 5"/>
+          <p:cNvSpPr>
+            <a:spLocks noGrp="1"/>
+          </p:cNvSpPr>
+          <p:nvPr>
+            <p:ph type="subTitle" idx="1"/>
+          </p:nvPr>
+        </p:nvSpPr>
+        <p:spPr>
+          <a:xfrm>
+            <a:off x="1256555" y="5654834"/>
+            <a:ext cx="9041990" cy="838330"/>
+          </a:xfrm>
+        </p:spPr>
+        <p:txBody>
+          <a:bodyPr>
+            <a:normAutofit/>
+          </a:bodyPr>
+          <a:lstStyle/>
+          <a:p>
+            <a:r>
+              <a:rPr lang="de-DE" dirty="0" smtClean="0"/>
+              <a:t>Problem: Der Punktestand soll in beiden </a:t>
+            </a:r>
+            <a:r>
+              <a:rPr lang="de-DE" dirty="0" err="1" smtClean="0"/>
+              <a:t>szenen</a:t>
+            </a:r>
+            <a:r>
+              <a:rPr lang="de-DE" dirty="0" smtClean="0"/>
+              <a:t> auslesbar sein</a:t>
+            </a:r>
+          </a:p>
+          <a:p>
+            <a:r>
+              <a:rPr lang="de-DE" dirty="0" smtClean="0"/>
+              <a:t>Lösung: </a:t>
+            </a:r>
+            <a:r>
+              <a:rPr lang="de-DE" u="sng" dirty="0" smtClean="0"/>
+              <a:t>Singleton</a:t>
+            </a:r>
+            <a:endParaRPr lang="de-DE" u="sng" dirty="0"/>
+          </a:p>
+        </p:txBody>
+      </p:sp>
+      <p:pic>
+        <p:nvPicPr>
+          <p:cNvPr id="7" name="Grafik 6"/>
+          <p:cNvPicPr>
+            <a:picLocks noChangeAspect="1"/>
+          </p:cNvPicPr>
+          <p:nvPr/>
+        </p:nvPicPr>
+        <p:blipFill>
+          <a:blip r:embed="rId3"/>
+          <a:stretch>
+            <a:fillRect/>
+          </a:stretch>
+        </p:blipFill>
+        <p:spPr>
+          <a:xfrm>
+            <a:off x="6701321" y="1433077"/>
+            <a:ext cx="2871832" cy="1887064"/>
+          </a:xfrm>
+          <a:prstGeom prst="rect">
+            <a:avLst/>
+          </a:prstGeom>
+          <a:effectLst>
+            <a:reflection blurRad="6350" stA="52000" endA="300" endPos="35000" dir="5400000" sy="-100000" algn="bl" rotWithShape="0"/>
+          </a:effectLst>
+        </p:spPr>
+      </p:pic>
+      <p:sp>
+        <p:nvSpPr>
+          <p:cNvPr id="8" name="Textfeld 7"/>
+          <p:cNvSpPr txBox="1"/>
+          <p:nvPr/>
+        </p:nvSpPr>
+        <p:spPr>
+          <a:xfrm>
+            <a:off x="1607128" y="692727"/>
+            <a:ext cx="8307771" cy="369332"/>
+          </a:xfrm>
+          <a:prstGeom prst="rect">
+            <a:avLst/>
+          </a:prstGeom>
+          <a:noFill/>
+        </p:spPr>
+        <p:txBody>
+          <a:bodyPr wrap="square" rtlCol="0">
+            <a:spAutoFit/>
+          </a:bodyPr>
+          <a:lstStyle/>
+          <a:p>
+            <a:r>
+              <a:rPr lang="de-DE" dirty="0" err="1" smtClean="0"/>
+              <a:t>Level.tscn</a:t>
+            </a:r>
+            <a:r>
+              <a:rPr lang="de-DE" dirty="0" smtClean="0"/>
+              <a:t>									</a:t>
+            </a:r>
+            <a:r>
+              <a:rPr lang="de-DE" dirty="0" err="1" smtClean="0"/>
+              <a:t>Menu.tscn</a:t>
+            </a:r>
+            <a:endParaRPr lang="de-DE" dirty="0"/>
+          </a:p>
+        </p:txBody>
+      </p:sp>
+      <p:sp>
+        <p:nvSpPr>
+          <p:cNvPr id="9" name="Textfeld 8"/>
+          <p:cNvSpPr txBox="1"/>
+          <p:nvPr/>
+        </p:nvSpPr>
+        <p:spPr>
+          <a:xfrm>
+            <a:off x="4938977" y="4789053"/>
+            <a:ext cx="1644072" cy="369332"/>
+          </a:xfrm>
+          <a:prstGeom prst="rect">
+            <a:avLst/>
+          </a:prstGeom>
+          <a:noFill/>
+        </p:spPr>
+        <p:txBody>
+          <a:bodyPr wrap="square" rtlCol="0">
+            <a:spAutoFit/>
+          </a:bodyPr>
+          <a:lstStyle/>
+          <a:p>
+            <a:r>
+              <a:rPr lang="de-DE" dirty="0" smtClean="0"/>
+              <a:t>Punktestand</a:t>
+            </a:r>
+            <a:endParaRPr lang="de-DE" dirty="0"/>
+          </a:p>
+        </p:txBody>
+      </p:sp>
+      <p:cxnSp>
+        <p:nvCxnSpPr>
+          <p:cNvPr id="11" name="Gerade Verbindung mit Pfeil 10"/>
+          <p:cNvCxnSpPr/>
+          <p:nvPr/>
+        </p:nvCxnSpPr>
+        <p:spPr>
+          <a:xfrm flipV="1">
+            <a:off x="6216073" y="3703782"/>
+            <a:ext cx="766618" cy="1016000"/>
+          </a:xfrm>
+          <a:prstGeom prst="straightConnector1">
+            <a:avLst/>
+          </a:prstGeom>
+          <a:ln>
+            <a:tailEnd type="triangle"/>
+          </a:ln>
+        </p:spPr>
+        <p:style>
+          <a:lnRef idx="3">
+            <a:schemeClr val="accent1"/>
+          </a:lnRef>
+          <a:fillRef idx="0">
+            <a:schemeClr val="accent1"/>
+          </a:fillRef>
+          <a:effectRef idx="2">
+            <a:schemeClr val="accent1"/>
+          </a:effectRef>
+          <a:fontRef idx="minor">
+            <a:schemeClr val="tx1"/>
+          </a:fontRef>
+        </p:style>
+      </p:cxnSp>
+      <p:cxnSp>
+        <p:nvCxnSpPr>
+          <p:cNvPr id="12" name="Gerade Verbindung mit Pfeil 11"/>
+          <p:cNvCxnSpPr/>
+          <p:nvPr/>
+        </p:nvCxnSpPr>
+        <p:spPr>
+          <a:xfrm flipH="1" flipV="1">
+            <a:off x="4294909" y="3583709"/>
+            <a:ext cx="835891" cy="1170709"/>
+          </a:xfrm>
+          <a:prstGeom prst="straightConnector1">
+            <a:avLst/>
+          </a:prstGeom>
+          <a:ln>
+            <a:tailEnd type="triangle"/>
+          </a:ln>
+        </p:spPr>
+        <p:style>
+          <a:lnRef idx="3">
+            <a:schemeClr val="accent1"/>
+          </a:lnRef>
+          <a:fillRef idx="0">
+            <a:schemeClr val="accent1"/>
+          </a:fillRef>
+          <a:effectRef idx="2">
+            <a:schemeClr val="accent1"/>
+          </a:effectRef>
+          <a:fontRef idx="minor">
+            <a:schemeClr val="tx1"/>
+          </a:fontRef>
+        </p:style>
+      </p:cxnSp>
+    </p:spTree>
+    <p:extLst>
+      <p:ext uri="{BB962C8B-B14F-4D97-AF65-F5344CB8AC3E}">
+        <p14:creationId xmlns:p14="http://schemas.microsoft.com/office/powerpoint/2010/main" val="2514374602"/>
+      </p:ext>
+    </p:extLst>
+  </p:cSld>
+  <p:clrMapOvr>
+    <a:masterClrMapping/>
+  </p:clrMapOvr>
+  <p:timing>
+    <p:tnLst>
+      <p:par>
+        <p:cTn id="1" dur="indefinite" restart="never" nodeType="tmRoot"/>
+      </p:par>
+    </p:tnLst>
+  </p:timing>
+</p:sld>
+</file>
+
+<file path=ppt/slides/slide27.xml><?xml version="1.0" encoding="utf-8"?>
+<p:sld xmlns:a="http://schemas.openxmlformats.org/drawingml/2006/main" xmlns:r="http://schemas.openxmlformats.org/officeDocument/2006/relationships" xmlns:p="http://schemas.openxmlformats.org/presentationml/2006/main">
+  <p:cSld>
+    <p:spTree>
+      <p:nvGrpSpPr>
+        <p:cNvPr id="1" name=""/>
+        <p:cNvGrpSpPr/>
+        <p:nvPr/>
+      </p:nvGrpSpPr>
+      <p:grpSpPr>
+        <a:xfrm>
+          <a:off x="0" y="0"/>
+          <a:ext cx="0" cy="0"/>
+          <a:chOff x="0" y="0"/>
+          <a:chExt cx="0" cy="0"/>
+        </a:xfrm>
+      </p:grpSpPr>
+      <p:pic>
+        <p:nvPicPr>
+          <p:cNvPr id="7" name="Grafik 6"/>
+          <p:cNvPicPr>
+            <a:picLocks noChangeAspect="1"/>
+          </p:cNvPicPr>
+          <p:nvPr/>
+        </p:nvPicPr>
+        <p:blipFill>
+          <a:blip r:embed="rId2"/>
+          <a:stretch>
+            <a:fillRect/>
+          </a:stretch>
+        </p:blipFill>
+        <p:spPr>
+          <a:xfrm>
+            <a:off x="1085612" y="1091330"/>
+            <a:ext cx="7096278" cy="4662923"/>
+          </a:xfrm>
+          <a:prstGeom prst="rect">
+            <a:avLst/>
+          </a:prstGeom>
+          <a:effectLst/>
+        </p:spPr>
+      </p:pic>
+      <p:cxnSp>
+        <p:nvCxnSpPr>
+          <p:cNvPr id="5" name="Gerade Verbindung mit Pfeil 4"/>
+          <p:cNvCxnSpPr/>
+          <p:nvPr/>
+        </p:nvCxnSpPr>
+        <p:spPr>
+          <a:xfrm flipH="1" flipV="1">
+            <a:off x="8181891" y="5698118"/>
+            <a:ext cx="1202254" cy="250099"/>
+          </a:xfrm>
+          <a:prstGeom prst="straightConnector1">
+            <a:avLst/>
+          </a:prstGeom>
+          <a:ln>
+            <a:tailEnd type="triangle"/>
+          </a:ln>
+        </p:spPr>
+        <p:style>
+          <a:lnRef idx="3">
+            <a:schemeClr val="accent1"/>
+          </a:lnRef>
+          <a:fillRef idx="0">
+            <a:schemeClr val="accent1"/>
+          </a:fillRef>
+          <a:effectRef idx="2">
+            <a:schemeClr val="accent1"/>
+          </a:effectRef>
+          <a:fontRef idx="minor">
+            <a:schemeClr val="tx1"/>
+          </a:fontRef>
+        </p:style>
+      </p:cxnSp>
+      <p:sp>
+        <p:nvSpPr>
+          <p:cNvPr id="13" name="Textfeld 12"/>
+          <p:cNvSpPr txBox="1"/>
+          <p:nvPr/>
+        </p:nvSpPr>
+        <p:spPr>
+          <a:xfrm>
+            <a:off x="9481127" y="5666509"/>
+            <a:ext cx="1948872" cy="646331"/>
+          </a:xfrm>
+          <a:prstGeom prst="rect">
+            <a:avLst/>
+          </a:prstGeom>
+          <a:noFill/>
+        </p:spPr>
+        <p:txBody>
+          <a:bodyPr wrap="square" rtlCol="0">
+            <a:spAutoFit/>
+          </a:bodyPr>
+          <a:lstStyle/>
+          <a:p>
+            <a:r>
+              <a:rPr lang="de-DE" dirty="0" err="1" smtClean="0"/>
+              <a:t>Nodetyp</a:t>
+            </a:r>
+            <a:r>
+              <a:rPr lang="de-DE" dirty="0" smtClean="0"/>
+              <a:t>: </a:t>
+            </a:r>
+            <a:r>
+              <a:rPr lang="de-DE" b="1" dirty="0" smtClean="0"/>
+              <a:t>Control</a:t>
+            </a:r>
+            <a:endParaRPr lang="de-DE" b="1" dirty="0"/>
+          </a:p>
+        </p:txBody>
+      </p:sp>
+      <p:grpSp>
+        <p:nvGrpSpPr>
+          <p:cNvPr id="20" name="Gruppieren 19"/>
+          <p:cNvGrpSpPr/>
+          <p:nvPr/>
+        </p:nvGrpSpPr>
+        <p:grpSpPr>
+          <a:xfrm>
+            <a:off x="5828146" y="2336800"/>
+            <a:ext cx="5320144" cy="1152703"/>
+            <a:chOff x="5828146" y="2336800"/>
+            <a:chExt cx="5320144" cy="1152703"/>
+          </a:xfrm>
+        </p:grpSpPr>
+        <p:sp>
+          <p:nvSpPr>
+            <p:cNvPr id="10" name="Textfeld 9"/>
+            <p:cNvSpPr txBox="1"/>
+            <p:nvPr/>
+          </p:nvSpPr>
+          <p:spPr>
+            <a:xfrm>
+              <a:off x="9199418" y="2530764"/>
+              <a:ext cx="1948872" cy="646331"/>
+            </a:xfrm>
+            <a:prstGeom prst="rect">
+              <a:avLst/>
+            </a:prstGeom>
+            <a:noFill/>
+          </p:spPr>
+          <p:txBody>
+            <a:bodyPr wrap="square" rtlCol="0">
+              <a:spAutoFit/>
+            </a:bodyPr>
+            <a:lstStyle/>
+            <a:p>
+              <a:r>
+                <a:rPr lang="de-DE" dirty="0" err="1" smtClean="0"/>
+                <a:t>Nodetyp</a:t>
+              </a:r>
+              <a:r>
+                <a:rPr lang="de-DE" dirty="0" smtClean="0"/>
+                <a:t>:</a:t>
+              </a:r>
+            </a:p>
+            <a:p>
+              <a:r>
+                <a:rPr lang="de-DE" b="1" dirty="0" err="1" smtClean="0"/>
+                <a:t>TextureRect</a:t>
+              </a:r>
+              <a:endParaRPr lang="de-DE" b="1" dirty="0"/>
+            </a:p>
+          </p:txBody>
+        </p:sp>
+        <p:cxnSp>
+          <p:nvCxnSpPr>
+            <p:cNvPr id="14" name="Gerade Verbindung mit Pfeil 13"/>
+            <p:cNvCxnSpPr/>
+            <p:nvPr/>
+          </p:nvCxnSpPr>
+          <p:spPr>
+            <a:xfrm flipH="1" flipV="1">
+              <a:off x="6594764" y="2336800"/>
+              <a:ext cx="2604655" cy="633411"/>
+            </a:xfrm>
+            <a:prstGeom prst="straightConnector1">
+              <a:avLst/>
+            </a:prstGeom>
+            <a:ln>
+              <a:tailEnd type="triangle"/>
+            </a:ln>
+          </p:spPr>
+          <p:style>
+            <a:lnRef idx="3">
+              <a:schemeClr val="accent1"/>
+            </a:lnRef>
+            <a:fillRef idx="0">
+              <a:schemeClr val="accent1"/>
+            </a:fillRef>
+            <a:effectRef idx="2">
+              <a:schemeClr val="accent1"/>
+            </a:effectRef>
+            <a:fontRef idx="minor">
+              <a:schemeClr val="tx1"/>
+            </a:fontRef>
+          </p:style>
+        </p:cxnSp>
+        <p:cxnSp>
+          <p:nvCxnSpPr>
+            <p:cNvPr id="16" name="Gerade Verbindung mit Pfeil 15"/>
+            <p:cNvCxnSpPr/>
+            <p:nvPr/>
+          </p:nvCxnSpPr>
+          <p:spPr>
+            <a:xfrm flipH="1">
+              <a:off x="5828146" y="3075709"/>
+              <a:ext cx="3371271" cy="413794"/>
+            </a:xfrm>
+            <a:prstGeom prst="straightConnector1">
+              <a:avLst/>
+            </a:prstGeom>
+            <a:ln>
+              <a:tailEnd type="triangle"/>
+            </a:ln>
+          </p:spPr>
+          <p:style>
+            <a:lnRef idx="3">
+              <a:schemeClr val="accent1"/>
+            </a:lnRef>
+            <a:fillRef idx="0">
+              <a:schemeClr val="accent1"/>
+            </a:fillRef>
+            <a:effectRef idx="2">
+              <a:schemeClr val="accent1"/>
+            </a:effectRef>
+            <a:fontRef idx="minor">
+              <a:schemeClr val="tx1"/>
+            </a:fontRef>
+          </p:style>
+        </p:cxnSp>
+      </p:grpSp>
+      <p:grpSp>
+        <p:nvGrpSpPr>
+          <p:cNvPr id="27" name="Gruppieren 26"/>
+          <p:cNvGrpSpPr/>
+          <p:nvPr/>
+        </p:nvGrpSpPr>
+        <p:grpSpPr>
+          <a:xfrm>
+            <a:off x="5728892" y="4356858"/>
+            <a:ext cx="5077653" cy="1144950"/>
+            <a:chOff x="5728892" y="4356858"/>
+            <a:chExt cx="5077653" cy="1144950"/>
+          </a:xfrm>
+        </p:grpSpPr>
+        <p:cxnSp>
+          <p:nvCxnSpPr>
+            <p:cNvPr id="21" name="Gerade Verbindung mit Pfeil 20"/>
+            <p:cNvCxnSpPr/>
+            <p:nvPr/>
+          </p:nvCxnSpPr>
+          <p:spPr>
+            <a:xfrm flipH="1">
+              <a:off x="6132945" y="4588019"/>
+              <a:ext cx="2937164" cy="366571"/>
+            </a:xfrm>
+            <a:prstGeom prst="straightConnector1">
+              <a:avLst/>
+            </a:prstGeom>
+            <a:ln>
+              <a:tailEnd type="triangle"/>
+            </a:ln>
+          </p:spPr>
+          <p:style>
+            <a:lnRef idx="3">
+              <a:schemeClr val="accent1"/>
+            </a:lnRef>
+            <a:fillRef idx="0">
+              <a:schemeClr val="accent1"/>
+            </a:fillRef>
+            <a:effectRef idx="2">
+              <a:schemeClr val="accent1"/>
+            </a:effectRef>
+            <a:fontRef idx="minor">
+              <a:schemeClr val="tx1"/>
+            </a:fontRef>
+          </p:style>
+        </p:cxnSp>
+        <p:cxnSp>
+          <p:nvCxnSpPr>
+            <p:cNvPr id="23" name="Gerade Verbindung mit Pfeil 22"/>
+            <p:cNvCxnSpPr/>
+            <p:nvPr/>
+          </p:nvCxnSpPr>
+          <p:spPr>
+            <a:xfrm flipH="1">
+              <a:off x="5728892" y="4749044"/>
+              <a:ext cx="3341217" cy="752764"/>
+            </a:xfrm>
+            <a:prstGeom prst="straightConnector1">
+              <a:avLst/>
+            </a:prstGeom>
+            <a:ln>
+              <a:tailEnd type="triangle"/>
+            </a:ln>
+          </p:spPr>
+          <p:style>
+            <a:lnRef idx="3">
+              <a:schemeClr val="accent1"/>
+            </a:lnRef>
+            <a:fillRef idx="0">
+              <a:schemeClr val="accent1"/>
+            </a:fillRef>
+            <a:effectRef idx="2">
+              <a:schemeClr val="accent1"/>
+            </a:effectRef>
+            <a:fontRef idx="minor">
+              <a:schemeClr val="tx1"/>
+            </a:fontRef>
+          </p:style>
+        </p:cxnSp>
+        <p:sp>
+          <p:nvSpPr>
+            <p:cNvPr id="26" name="Textfeld 25"/>
+            <p:cNvSpPr txBox="1"/>
+            <p:nvPr/>
+          </p:nvSpPr>
+          <p:spPr>
+            <a:xfrm>
+              <a:off x="9301018" y="4356858"/>
+              <a:ext cx="1505527" cy="646331"/>
+            </a:xfrm>
+            <a:prstGeom prst="rect">
+              <a:avLst/>
+            </a:prstGeom>
+            <a:noFill/>
+          </p:spPr>
+          <p:txBody>
+            <a:bodyPr wrap="square" rtlCol="0">
+              <a:spAutoFit/>
+            </a:bodyPr>
+            <a:lstStyle/>
+            <a:p>
+              <a:r>
+                <a:rPr lang="de-DE" dirty="0" err="1" smtClean="0"/>
+                <a:t>Nodetyp</a:t>
+              </a:r>
+              <a:r>
+                <a:rPr lang="de-DE" dirty="0" smtClean="0"/>
+                <a:t>: </a:t>
+              </a:r>
+              <a:r>
+                <a:rPr lang="de-DE" b="1" dirty="0" smtClean="0"/>
+                <a:t>Label</a:t>
+              </a:r>
+              <a:endParaRPr lang="de-DE" b="1" dirty="0"/>
+            </a:p>
+          </p:txBody>
+        </p:sp>
+      </p:grpSp>
+    </p:spTree>
+    <p:extLst>
+      <p:ext uri="{BB962C8B-B14F-4D97-AF65-F5344CB8AC3E}">
+        <p14:creationId xmlns:p14="http://schemas.microsoft.com/office/powerpoint/2010/main" val="1874318862"/>
+      </p:ext>
+    </p:extLst>
+  </p:cSld>
+  <p:clrMapOvr>
+    <a:masterClrMapping/>
+  </p:clrMapOvr>
+  <p:timing>
+    <p:tnLst>
+      <p:par>
+        <p:cTn id="1" dur="indefinite" restart="never" nodeType="tmRoot">
+          <p:childTnLst>
+            <p:seq concurrent="1" nextAc="seek">
+              <p:cTn id="2" dur="indefinite" nodeType="mainSeq">
+                <p:childTnLst>
+                  <p:par>
+                    <p:cTn id="3" fill="hold">
+                      <p:stCondLst>
+                        <p:cond delay="indefinite"/>
+                      </p:stCondLst>
+                      <p:childTnLst>
+                        <p:par>
+                          <p:cTn id="4" fill="hold">
+                            <p:stCondLst>
+                              <p:cond delay="0"/>
+                            </p:stCondLst>
+                            <p:childTnLst>
+                              <p:par>
+                                <p:cTn id="5" presetID="1" presetClass="entr" presetSubtype="0" fill="hold" nodeType="clickEffect">
+                                  <p:stCondLst>
+                                    <p:cond delay="0"/>
+                                  </p:stCondLst>
+                                  <p:childTnLst>
+                                    <p:set>
+                                      <p:cBhvr>
+                                        <p:cTn id="6" dur="1" fill="hold">
+                                          <p:stCondLst>
+                                            <p:cond delay="0"/>
+                                          </p:stCondLst>
+                                        </p:cTn>
+                                        <p:tgtEl>
+                                          <p:spTgt spid="20"/>
+                                        </p:tgtEl>
+                                        <p:attrNameLst>
+                                          <p:attrName>style.visibility</p:attrName>
+                                        </p:attrNameLst>
+                                      </p:cBhvr>
+                                      <p:to>
+                                        <p:strVal val="visible"/>
+                                      </p:to>
+                                    </p:set>
+                                  </p:childTnLst>
+                                </p:cTn>
+                              </p:par>
+                            </p:childTnLst>
+                          </p:cTn>
+                        </p:par>
+                      </p:childTnLst>
+                    </p:cTn>
+                  </p:par>
+                  <p:par>
+                    <p:cTn id="7" fill="hold">
+                      <p:stCondLst>
+                        <p:cond delay="indefinite"/>
+                      </p:stCondLst>
+                      <p:childTnLst>
+                        <p:par>
+                          <p:cTn id="8" fill="hold">
+                            <p:stCondLst>
+                              <p:cond delay="0"/>
+                            </p:stCondLst>
+                            <p:childTnLst>
+                              <p:par>
+                                <p:cTn id="9" presetID="1" presetClass="entr" presetSubtype="0" fill="hold" nodeType="clickEffect">
+                                  <p:stCondLst>
+                                    <p:cond delay="0"/>
+                                  </p:stCondLst>
+                                  <p:childTnLst>
+                                    <p:set>
+                                      <p:cBhvr>
+                                        <p:cTn id="10" dur="1" fill="hold">
+                                          <p:stCondLst>
+                                            <p:cond delay="0"/>
+                                          </p:stCondLst>
+                                        </p:cTn>
+                                        <p:tgtEl>
+                                          <p:spTgt spid="27"/>
+                                        </p:tgtEl>
+                                        <p:attrNameLst>
+                                          <p:attrName>style.visibility</p:attrName>
+                                        </p:attrNameLst>
+                                      </p:cBhvr>
+                                      <p:to>
+                                        <p:strVal val="visible"/>
+                                      </p:to>
+                                    </p:set>
+                                  </p:childTnLst>
+                                </p:cTn>
+                              </p:par>
+                            </p:childTnLst>
+                          </p:cTn>
+                        </p:par>
+                      </p:childTnLst>
+                    </p:cTn>
+                  </p:par>
+                </p:childTnLst>
+              </p:cTn>
+              <p:prevCondLst>
+                <p:cond evt="onPrev" delay="0">
+                  <p:tgtEl>
+                    <p:sldTgt/>
+                  </p:tgtEl>
+                </p:cond>
+              </p:prevCondLst>
+              <p:nextCondLst>
+                <p:cond evt="onNext" delay="0">
+                  <p:tgtEl>
+                    <p:sldTgt/>
+                  </p:tgtEl>
+                </p:cond>
+              </p:nextCondLst>
+            </p:seq>
+          </p:childTnLst>
+        </p:cTn>
+      </p:par>
+    </p:tnLst>
+  </p:timing>
+</p:sld>
+</file>
+
+<file path=ppt/slides/slide28.xml><?xml version="1.0" encoding="utf-8"?>
+<p:sld xmlns:a="http://schemas.openxmlformats.org/drawingml/2006/main" xmlns:r="http://schemas.openxmlformats.org/officeDocument/2006/relationships" xmlns:p="http://schemas.openxmlformats.org/presentationml/2006/main">
+  <p:cSld>
+    <p:spTree>
+      <p:nvGrpSpPr>
+        <p:cNvPr id="1" name=""/>
+        <p:cNvGrpSpPr/>
+        <p:nvPr/>
+      </p:nvGrpSpPr>
+      <p:grpSpPr>
+        <a:xfrm>
+          <a:off x="0" y="0"/>
+          <a:ext cx="0" cy="0"/>
+          <a:chOff x="0" y="0"/>
+          <a:chExt cx="0" cy="0"/>
+        </a:xfrm>
+      </p:grpSpPr>
+      <p:pic>
+        <p:nvPicPr>
+          <p:cNvPr id="4" name="Grafik 3"/>
+          <p:cNvPicPr>
+            <a:picLocks noChangeAspect="1"/>
+          </p:cNvPicPr>
+          <p:nvPr/>
+        </p:nvPicPr>
+        <p:blipFill>
+          <a:blip r:embed="rId2"/>
+          <a:stretch>
+            <a:fillRect/>
+          </a:stretch>
+        </p:blipFill>
+        <p:spPr>
+          <a:xfrm>
+            <a:off x="1496292" y="1433077"/>
+            <a:ext cx="3251200" cy="1887064"/>
+          </a:xfrm>
+          <a:prstGeom prst="roundRect">
+            <a:avLst>
+              <a:gd name="adj" fmla="val 8594"/>
+            </a:avLst>
+          </a:prstGeom>
+          <a:solidFill>
+            <a:srgbClr val="FFFFFF">
+              <a:shade val="85000"/>
+            </a:srgbClr>
+          </a:solidFill>
+          <a:ln>
+            <a:noFill/>
+          </a:ln>
+          <a:effectLst>
+            <a:reflection blurRad="12700" stA="38000" endPos="28000" dist="5000" dir="5400000" sy="-100000" algn="bl" rotWithShape="0"/>
+          </a:effectLst>
+        </p:spPr>
+      </p:pic>
+      <p:pic>
+        <p:nvPicPr>
+          <p:cNvPr id="7" name="Grafik 6"/>
+          <p:cNvPicPr>
+            <a:picLocks noChangeAspect="1"/>
+          </p:cNvPicPr>
+          <p:nvPr/>
+        </p:nvPicPr>
+        <p:blipFill>
+          <a:blip r:embed="rId3"/>
+          <a:stretch>
+            <a:fillRect/>
+          </a:stretch>
+        </p:blipFill>
+        <p:spPr>
+          <a:xfrm>
+            <a:off x="6701321" y="1433077"/>
+            <a:ext cx="2871832" cy="1887064"/>
+          </a:xfrm>
+          <a:prstGeom prst="rect">
+            <a:avLst/>
+          </a:prstGeom>
+          <a:effectLst>
+            <a:reflection blurRad="6350" stA="52000" endA="300" endPos="35000" dir="5400000" sy="-100000" algn="bl" rotWithShape="0"/>
+          </a:effectLst>
+        </p:spPr>
+      </p:pic>
+      <p:sp>
+        <p:nvSpPr>
+          <p:cNvPr id="8" name="Textfeld 7"/>
+          <p:cNvSpPr txBox="1"/>
+          <p:nvPr/>
+        </p:nvSpPr>
+        <p:spPr>
+          <a:xfrm>
+            <a:off x="1607128" y="692727"/>
+            <a:ext cx="8307771" cy="369332"/>
+          </a:xfrm>
+          <a:prstGeom prst="rect">
+            <a:avLst/>
+          </a:prstGeom>
+          <a:noFill/>
+        </p:spPr>
+        <p:txBody>
+          <a:bodyPr wrap="square" rtlCol="0">
+            <a:spAutoFit/>
+          </a:bodyPr>
+          <a:lstStyle/>
+          <a:p>
+            <a:r>
+              <a:rPr lang="de-DE" dirty="0" err="1" smtClean="0"/>
+              <a:t>Level.tscn</a:t>
+            </a:r>
+            <a:r>
+              <a:rPr lang="de-DE" dirty="0" smtClean="0"/>
+              <a:t>									</a:t>
+            </a:r>
+            <a:r>
+              <a:rPr lang="de-DE" dirty="0" err="1" smtClean="0"/>
+              <a:t>Menu.tscn</a:t>
+            </a:r>
+            <a:endParaRPr lang="de-DE" dirty="0"/>
+          </a:p>
+        </p:txBody>
+      </p:sp>
+      <p:cxnSp>
+        <p:nvCxnSpPr>
+          <p:cNvPr id="11" name="Gerade Verbindung mit Pfeil 10"/>
+          <p:cNvCxnSpPr/>
+          <p:nvPr/>
+        </p:nvCxnSpPr>
+        <p:spPr>
+          <a:xfrm>
+            <a:off x="5204353" y="2553730"/>
+            <a:ext cx="1129314" cy="32452"/>
+          </a:xfrm>
+          <a:prstGeom prst="straightConnector1">
+            <a:avLst/>
+          </a:prstGeom>
+          <a:ln>
+            <a:tailEnd type="triangle"/>
+          </a:ln>
+        </p:spPr>
+        <p:style>
+          <a:lnRef idx="3">
+            <a:schemeClr val="accent1"/>
+          </a:lnRef>
+          <a:fillRef idx="0">
+            <a:schemeClr val="accent1"/>
+          </a:fillRef>
+          <a:effectRef idx="2">
+            <a:schemeClr val="accent1"/>
+          </a:effectRef>
+          <a:fontRef idx="minor">
+            <a:schemeClr val="tx1"/>
+          </a:fontRef>
+        </p:style>
+      </p:cxnSp>
+      <p:cxnSp>
+        <p:nvCxnSpPr>
+          <p:cNvPr id="12" name="Gerade Verbindung mit Pfeil 11"/>
+          <p:cNvCxnSpPr/>
+          <p:nvPr/>
+        </p:nvCxnSpPr>
+        <p:spPr>
+          <a:xfrm flipH="1" flipV="1">
+            <a:off x="5188359" y="2759494"/>
+            <a:ext cx="1145308" cy="18472"/>
+          </a:xfrm>
+          <a:prstGeom prst="straightConnector1">
+            <a:avLst/>
+          </a:prstGeom>
+          <a:ln>
+            <a:tailEnd type="triangle"/>
+          </a:ln>
+        </p:spPr>
+        <p:style>
+          <a:lnRef idx="3">
+            <a:schemeClr val="accent1"/>
+          </a:lnRef>
+          <a:fillRef idx="0">
+            <a:schemeClr val="accent1"/>
+          </a:fillRef>
+          <a:effectRef idx="2">
+            <a:schemeClr val="accent1"/>
+          </a:effectRef>
+          <a:fontRef idx="minor">
+            <a:schemeClr val="tx1"/>
+          </a:fontRef>
+        </p:style>
+      </p:cxnSp>
+      <p:pic>
+        <p:nvPicPr>
+          <p:cNvPr id="10" name="Grafik 9"/>
+          <p:cNvPicPr>
+            <a:picLocks noChangeAspect="1"/>
+          </p:cNvPicPr>
+          <p:nvPr/>
+        </p:nvPicPr>
+        <p:blipFill>
+          <a:blip r:embed="rId4"/>
+          <a:stretch>
+            <a:fillRect/>
+          </a:stretch>
+        </p:blipFill>
+        <p:spPr>
+          <a:xfrm>
+            <a:off x="634774" y="4475401"/>
+            <a:ext cx="4553585" cy="314369"/>
+          </a:xfrm>
+          <a:prstGeom prst="rect">
+            <a:avLst/>
+          </a:prstGeom>
+        </p:spPr>
+      </p:pic>
+      <p:pic>
+        <p:nvPicPr>
+          <p:cNvPr id="13" name="Grafik 12"/>
+          <p:cNvPicPr>
+            <a:picLocks noChangeAspect="1"/>
+          </p:cNvPicPr>
+          <p:nvPr/>
+        </p:nvPicPr>
+        <p:blipFill>
+          <a:blip r:embed="rId5"/>
+          <a:stretch>
+            <a:fillRect/>
+          </a:stretch>
+        </p:blipFill>
+        <p:spPr>
+          <a:xfrm>
+            <a:off x="5769010" y="4210344"/>
+            <a:ext cx="5020302" cy="1401201"/>
+          </a:xfrm>
+          <a:prstGeom prst="rect">
+            <a:avLst/>
+          </a:prstGeom>
+        </p:spPr>
+      </p:pic>
+    </p:spTree>
+    <p:extLst>
+      <p:ext uri="{BB962C8B-B14F-4D97-AF65-F5344CB8AC3E}">
+        <p14:creationId xmlns:p14="http://schemas.microsoft.com/office/powerpoint/2010/main" val="2654932578"/>
       </p:ext>
     </p:extLst>
   </p:cSld>

</xml_diff>